<commit_message>
presentation added screen shoots
</commit_message>
<xml_diff>
--- a/documents/מצגת מועדה מלווה 2.pptx
+++ b/documents/מצגת מועדה מלווה 2.pptx
@@ -14,6 +14,13 @@
     <p:sldId id="258" r:id="rId8"/>
     <p:sldId id="260" r:id="rId9"/>
     <p:sldId id="261" r:id="rId10"/>
+    <p:sldId id="266" r:id="rId11"/>
+    <p:sldId id="267" r:id="rId12"/>
+    <p:sldId id="268" r:id="rId13"/>
+    <p:sldId id="269" r:id="rId14"/>
+    <p:sldId id="270" r:id="rId15"/>
+    <p:sldId id="271" r:id="rId16"/>
+    <p:sldId id="272" r:id="rId17"/>
   </p:sldIdLst>
   <p:sldSz cx="12192000" cy="6858000"/>
   <p:notesSz cx="6858000" cy="9144000"/>
@@ -3140,6 +3147,546 @@
 </p:sld>
 </file>
 
+<file path=ppt/slides/slide10.xml><?xml version="1.0" encoding="utf-8"?>
+<p:sld xmlns:a="http://schemas.openxmlformats.org/drawingml/2006/main" xmlns:r="http://schemas.openxmlformats.org/officeDocument/2006/relationships" xmlns:p="http://schemas.openxmlformats.org/presentationml/2006/main">
+  <p:cSld>
+    <p:spTree>
+      <p:nvGrpSpPr>
+        <p:cNvPr id="1" name=""/>
+        <p:cNvGrpSpPr/>
+        <p:nvPr/>
+      </p:nvGrpSpPr>
+      <p:grpSpPr>
+        <a:xfrm>
+          <a:off x="0" y="0"/>
+          <a:ext cx="0" cy="0"/>
+          <a:chOff x="0" y="0"/>
+          <a:chExt cx="0" cy="0"/>
+        </a:xfrm>
+      </p:grpSpPr>
+      <p:pic>
+        <p:nvPicPr>
+          <p:cNvPr id="12" name="תמונה 11">
+            <a:extLst>
+              <a:ext uri="{FF2B5EF4-FFF2-40B4-BE49-F238E27FC236}">
+                <a16:creationId xmlns:a16="http://schemas.microsoft.com/office/drawing/2014/main" id="{39C4C2DF-3AA5-40AE-9A02-2920804C372C}"/>
+              </a:ext>
+            </a:extLst>
+          </p:cNvPr>
+          <p:cNvPicPr>
+            <a:picLocks noChangeAspect="1"/>
+          </p:cNvPicPr>
+          <p:nvPr/>
+        </p:nvPicPr>
+        <p:blipFill>
+          <a:blip r:embed="rId2"/>
+          <a:stretch>
+            <a:fillRect/>
+          </a:stretch>
+        </p:blipFill>
+        <p:spPr>
+          <a:xfrm>
+            <a:off x="0" y="0"/>
+            <a:ext cx="12192000" cy="6858000"/>
+          </a:xfrm>
+          <a:prstGeom prst="rect">
+            <a:avLst/>
+          </a:prstGeom>
+        </p:spPr>
+      </p:pic>
+    </p:spTree>
+    <p:extLst>
+      <p:ext uri="{BB962C8B-B14F-4D97-AF65-F5344CB8AC3E}">
+        <p14:creationId xmlns:p14="http://schemas.microsoft.com/office/powerpoint/2010/main" val="2584671736"/>
+      </p:ext>
+    </p:extLst>
+  </p:cSld>
+  <p:clrMapOvr>
+    <a:masterClrMapping/>
+  </p:clrMapOvr>
+</p:sld>
+</file>
+
+<file path=ppt/slides/slide11.xml><?xml version="1.0" encoding="utf-8"?>
+<p:sld xmlns:a="http://schemas.openxmlformats.org/drawingml/2006/main" xmlns:r="http://schemas.openxmlformats.org/officeDocument/2006/relationships" xmlns:p="http://schemas.openxmlformats.org/presentationml/2006/main">
+  <p:cSld>
+    <p:spTree>
+      <p:nvGrpSpPr>
+        <p:cNvPr id="1" name=""/>
+        <p:cNvGrpSpPr/>
+        <p:nvPr/>
+      </p:nvGrpSpPr>
+      <p:grpSpPr>
+        <a:xfrm>
+          <a:off x="0" y="0"/>
+          <a:ext cx="0" cy="0"/>
+          <a:chOff x="0" y="0"/>
+          <a:chExt cx="0" cy="0"/>
+        </a:xfrm>
+      </p:grpSpPr>
+      <p:pic>
+        <p:nvPicPr>
+          <p:cNvPr id="3" name="תמונה 2">
+            <a:extLst>
+              <a:ext uri="{FF2B5EF4-FFF2-40B4-BE49-F238E27FC236}">
+                <a16:creationId xmlns:a16="http://schemas.microsoft.com/office/drawing/2014/main" id="{DA7851D7-39E1-4CBC-8397-9011BCE59BAB}"/>
+              </a:ext>
+            </a:extLst>
+          </p:cNvPr>
+          <p:cNvPicPr>
+            <a:picLocks noChangeAspect="1"/>
+          </p:cNvPicPr>
+          <p:nvPr/>
+        </p:nvPicPr>
+        <p:blipFill>
+          <a:blip r:embed="rId2"/>
+          <a:stretch>
+            <a:fillRect/>
+          </a:stretch>
+        </p:blipFill>
+        <p:spPr>
+          <a:xfrm>
+            <a:off x="0" y="0"/>
+            <a:ext cx="12192000" cy="6858000"/>
+          </a:xfrm>
+          <a:prstGeom prst="rect">
+            <a:avLst/>
+          </a:prstGeom>
+        </p:spPr>
+      </p:pic>
+      <p:pic>
+        <p:nvPicPr>
+          <p:cNvPr id="5" name="תמונה 4">
+            <a:extLst>
+              <a:ext uri="{FF2B5EF4-FFF2-40B4-BE49-F238E27FC236}">
+                <a16:creationId xmlns:a16="http://schemas.microsoft.com/office/drawing/2014/main" id="{4AADE070-21AE-4E7E-84F1-FB411A9C24FD}"/>
+              </a:ext>
+            </a:extLst>
+          </p:cNvPr>
+          <p:cNvPicPr>
+            <a:picLocks noChangeAspect="1"/>
+          </p:cNvPicPr>
+          <p:nvPr/>
+        </p:nvPicPr>
+        <p:blipFill>
+          <a:blip r:embed="rId3"/>
+          <a:stretch>
+            <a:fillRect/>
+          </a:stretch>
+        </p:blipFill>
+        <p:spPr>
+          <a:xfrm>
+            <a:off x="6862666" y="3428999"/>
+            <a:ext cx="1128810" cy="1114425"/>
+          </a:xfrm>
+          <a:prstGeom prst="rect">
+            <a:avLst/>
+          </a:prstGeom>
+        </p:spPr>
+      </p:pic>
+    </p:spTree>
+    <p:extLst>
+      <p:ext uri="{BB962C8B-B14F-4D97-AF65-F5344CB8AC3E}">
+        <p14:creationId xmlns:p14="http://schemas.microsoft.com/office/powerpoint/2010/main" val="1314419874"/>
+      </p:ext>
+    </p:extLst>
+  </p:cSld>
+  <p:clrMapOvr>
+    <a:masterClrMapping/>
+  </p:clrMapOvr>
+</p:sld>
+</file>
+
+<file path=ppt/slides/slide12.xml><?xml version="1.0" encoding="utf-8"?>
+<p:sld xmlns:a="http://schemas.openxmlformats.org/drawingml/2006/main" xmlns:r="http://schemas.openxmlformats.org/officeDocument/2006/relationships" xmlns:p="http://schemas.openxmlformats.org/presentationml/2006/main">
+  <p:cSld>
+    <p:spTree>
+      <p:nvGrpSpPr>
+        <p:cNvPr id="1" name=""/>
+        <p:cNvGrpSpPr/>
+        <p:nvPr/>
+      </p:nvGrpSpPr>
+      <p:grpSpPr>
+        <a:xfrm>
+          <a:off x="0" y="0"/>
+          <a:ext cx="0" cy="0"/>
+          <a:chOff x="0" y="0"/>
+          <a:chExt cx="0" cy="0"/>
+        </a:xfrm>
+      </p:grpSpPr>
+      <p:pic>
+        <p:nvPicPr>
+          <p:cNvPr id="3" name="תמונה 2">
+            <a:extLst>
+              <a:ext uri="{FF2B5EF4-FFF2-40B4-BE49-F238E27FC236}">
+                <a16:creationId xmlns:a16="http://schemas.microsoft.com/office/drawing/2014/main" id="{6B4C467F-E32C-4187-993B-88822FDB9293}"/>
+              </a:ext>
+            </a:extLst>
+          </p:cNvPr>
+          <p:cNvPicPr>
+            <a:picLocks noChangeAspect="1"/>
+          </p:cNvPicPr>
+          <p:nvPr/>
+        </p:nvPicPr>
+        <p:blipFill>
+          <a:blip r:embed="rId2"/>
+          <a:stretch>
+            <a:fillRect/>
+          </a:stretch>
+        </p:blipFill>
+        <p:spPr>
+          <a:xfrm>
+            <a:off x="0" y="0"/>
+            <a:ext cx="12192000" cy="6858000"/>
+          </a:xfrm>
+          <a:prstGeom prst="rect">
+            <a:avLst/>
+          </a:prstGeom>
+        </p:spPr>
+      </p:pic>
+      <p:pic>
+        <p:nvPicPr>
+          <p:cNvPr id="5" name="תמונה 4">
+            <a:extLst>
+              <a:ext uri="{FF2B5EF4-FFF2-40B4-BE49-F238E27FC236}">
+                <a16:creationId xmlns:a16="http://schemas.microsoft.com/office/drawing/2014/main" id="{5F6CE585-88D1-4607-89B3-85B82CABAF97}"/>
+              </a:ext>
+            </a:extLst>
+          </p:cNvPr>
+          <p:cNvPicPr>
+            <a:picLocks noChangeAspect="1"/>
+          </p:cNvPicPr>
+          <p:nvPr/>
+        </p:nvPicPr>
+        <p:blipFill>
+          <a:blip r:embed="rId3"/>
+          <a:stretch>
+            <a:fillRect/>
+          </a:stretch>
+        </p:blipFill>
+        <p:spPr>
+          <a:xfrm>
+            <a:off x="3410307" y="5537500"/>
+            <a:ext cx="1418868" cy="897779"/>
+          </a:xfrm>
+          <a:prstGeom prst="rect">
+            <a:avLst/>
+          </a:prstGeom>
+        </p:spPr>
+      </p:pic>
+      <p:pic>
+        <p:nvPicPr>
+          <p:cNvPr id="7" name="תמונה 6">
+            <a:extLst>
+              <a:ext uri="{FF2B5EF4-FFF2-40B4-BE49-F238E27FC236}">
+                <a16:creationId xmlns:a16="http://schemas.microsoft.com/office/drawing/2014/main" id="{1DDC6785-7B67-4A18-9808-D66CEB043435}"/>
+              </a:ext>
+            </a:extLst>
+          </p:cNvPr>
+          <p:cNvPicPr>
+            <a:picLocks noChangeAspect="1"/>
+          </p:cNvPicPr>
+          <p:nvPr/>
+        </p:nvPicPr>
+        <p:blipFill>
+          <a:blip r:embed="rId4"/>
+          <a:stretch>
+            <a:fillRect/>
+          </a:stretch>
+        </p:blipFill>
+        <p:spPr>
+          <a:xfrm>
+            <a:off x="9658350" y="5537500"/>
+            <a:ext cx="1000126" cy="916782"/>
+          </a:xfrm>
+          <a:prstGeom prst="rect">
+            <a:avLst/>
+          </a:prstGeom>
+        </p:spPr>
+      </p:pic>
+    </p:spTree>
+    <p:extLst>
+      <p:ext uri="{BB962C8B-B14F-4D97-AF65-F5344CB8AC3E}">
+        <p14:creationId xmlns:p14="http://schemas.microsoft.com/office/powerpoint/2010/main" val="1259309522"/>
+      </p:ext>
+    </p:extLst>
+  </p:cSld>
+  <p:clrMapOvr>
+    <a:masterClrMapping/>
+  </p:clrMapOvr>
+</p:sld>
+</file>
+
+<file path=ppt/slides/slide13.xml><?xml version="1.0" encoding="utf-8"?>
+<p:sld xmlns:a="http://schemas.openxmlformats.org/drawingml/2006/main" xmlns:r="http://schemas.openxmlformats.org/officeDocument/2006/relationships" xmlns:p="http://schemas.openxmlformats.org/presentationml/2006/main">
+  <p:cSld>
+    <p:spTree>
+      <p:nvGrpSpPr>
+        <p:cNvPr id="1" name=""/>
+        <p:cNvGrpSpPr/>
+        <p:nvPr/>
+      </p:nvGrpSpPr>
+      <p:grpSpPr>
+        <a:xfrm>
+          <a:off x="0" y="0"/>
+          <a:ext cx="0" cy="0"/>
+          <a:chOff x="0" y="0"/>
+          <a:chExt cx="0" cy="0"/>
+        </a:xfrm>
+      </p:grpSpPr>
+      <p:pic>
+        <p:nvPicPr>
+          <p:cNvPr id="3" name="תמונה 2">
+            <a:extLst>
+              <a:ext uri="{FF2B5EF4-FFF2-40B4-BE49-F238E27FC236}">
+                <a16:creationId xmlns:a16="http://schemas.microsoft.com/office/drawing/2014/main" id="{790DB6B4-7B78-4500-95AB-F25731BDD5C1}"/>
+              </a:ext>
+            </a:extLst>
+          </p:cNvPr>
+          <p:cNvPicPr>
+            <a:picLocks noChangeAspect="1"/>
+          </p:cNvPicPr>
+          <p:nvPr/>
+        </p:nvPicPr>
+        <p:blipFill>
+          <a:blip r:embed="rId2"/>
+          <a:stretch>
+            <a:fillRect/>
+          </a:stretch>
+        </p:blipFill>
+        <p:spPr>
+          <a:xfrm>
+            <a:off x="0" y="0"/>
+            <a:ext cx="12192000" cy="6858000"/>
+          </a:xfrm>
+          <a:prstGeom prst="rect">
+            <a:avLst/>
+          </a:prstGeom>
+        </p:spPr>
+      </p:pic>
+    </p:spTree>
+    <p:extLst>
+      <p:ext uri="{BB962C8B-B14F-4D97-AF65-F5344CB8AC3E}">
+        <p14:creationId xmlns:p14="http://schemas.microsoft.com/office/powerpoint/2010/main" val="2309401735"/>
+      </p:ext>
+    </p:extLst>
+  </p:cSld>
+  <p:clrMapOvr>
+    <a:masterClrMapping/>
+  </p:clrMapOvr>
+</p:sld>
+</file>
+
+<file path=ppt/slides/slide14.xml><?xml version="1.0" encoding="utf-8"?>
+<p:sld xmlns:a="http://schemas.openxmlformats.org/drawingml/2006/main" xmlns:r="http://schemas.openxmlformats.org/officeDocument/2006/relationships" xmlns:p="http://schemas.openxmlformats.org/presentationml/2006/main">
+  <p:cSld>
+    <p:spTree>
+      <p:nvGrpSpPr>
+        <p:cNvPr id="1" name=""/>
+        <p:cNvGrpSpPr/>
+        <p:nvPr/>
+      </p:nvGrpSpPr>
+      <p:grpSpPr>
+        <a:xfrm>
+          <a:off x="0" y="0"/>
+          <a:ext cx="0" cy="0"/>
+          <a:chOff x="0" y="0"/>
+          <a:chExt cx="0" cy="0"/>
+        </a:xfrm>
+      </p:grpSpPr>
+      <p:pic>
+        <p:nvPicPr>
+          <p:cNvPr id="9" name="תמונה 8">
+            <a:extLst>
+              <a:ext uri="{FF2B5EF4-FFF2-40B4-BE49-F238E27FC236}">
+                <a16:creationId xmlns:a16="http://schemas.microsoft.com/office/drawing/2014/main" id="{8E30B5BD-2C84-46E7-942A-8E4AEFDC7EF1}"/>
+              </a:ext>
+            </a:extLst>
+          </p:cNvPr>
+          <p:cNvPicPr>
+            <a:picLocks noChangeAspect="1"/>
+          </p:cNvPicPr>
+          <p:nvPr/>
+        </p:nvPicPr>
+        <p:blipFill>
+          <a:blip r:embed="rId2"/>
+          <a:stretch>
+            <a:fillRect/>
+          </a:stretch>
+        </p:blipFill>
+        <p:spPr>
+          <a:xfrm>
+            <a:off x="0" y="-35560"/>
+            <a:ext cx="12192000" cy="4166870"/>
+          </a:xfrm>
+          <a:prstGeom prst="rect">
+            <a:avLst/>
+          </a:prstGeom>
+        </p:spPr>
+      </p:pic>
+      <p:pic>
+        <p:nvPicPr>
+          <p:cNvPr id="11" name="תמונה 10">
+            <a:extLst>
+              <a:ext uri="{FF2B5EF4-FFF2-40B4-BE49-F238E27FC236}">
+                <a16:creationId xmlns:a16="http://schemas.microsoft.com/office/drawing/2014/main" id="{D28A72C0-808C-4D3E-AD5D-75A41796E083}"/>
+              </a:ext>
+            </a:extLst>
+          </p:cNvPr>
+          <p:cNvPicPr>
+            <a:picLocks noChangeAspect="1"/>
+          </p:cNvPicPr>
+          <p:nvPr/>
+        </p:nvPicPr>
+        <p:blipFill>
+          <a:blip r:embed="rId3"/>
+          <a:stretch>
+            <a:fillRect/>
+          </a:stretch>
+        </p:blipFill>
+        <p:spPr>
+          <a:xfrm>
+            <a:off x="0" y="4131310"/>
+            <a:ext cx="12192000" cy="2726690"/>
+          </a:xfrm>
+          <a:prstGeom prst="rect">
+            <a:avLst/>
+          </a:prstGeom>
+        </p:spPr>
+      </p:pic>
+    </p:spTree>
+    <p:extLst>
+      <p:ext uri="{BB962C8B-B14F-4D97-AF65-F5344CB8AC3E}">
+        <p14:creationId xmlns:p14="http://schemas.microsoft.com/office/powerpoint/2010/main" val="1265047197"/>
+      </p:ext>
+    </p:extLst>
+  </p:cSld>
+  <p:clrMapOvr>
+    <a:masterClrMapping/>
+  </p:clrMapOvr>
+</p:sld>
+</file>
+
+<file path=ppt/slides/slide15.xml><?xml version="1.0" encoding="utf-8"?>
+<p:sld xmlns:a="http://schemas.openxmlformats.org/drawingml/2006/main" xmlns:r="http://schemas.openxmlformats.org/officeDocument/2006/relationships" xmlns:p="http://schemas.openxmlformats.org/presentationml/2006/main">
+  <p:cSld>
+    <p:spTree>
+      <p:nvGrpSpPr>
+        <p:cNvPr id="1" name=""/>
+        <p:cNvGrpSpPr/>
+        <p:nvPr/>
+      </p:nvGrpSpPr>
+      <p:grpSpPr>
+        <a:xfrm>
+          <a:off x="0" y="0"/>
+          <a:ext cx="0" cy="0"/>
+          <a:chOff x="0" y="0"/>
+          <a:chExt cx="0" cy="0"/>
+        </a:xfrm>
+      </p:grpSpPr>
+      <p:pic>
+        <p:nvPicPr>
+          <p:cNvPr id="3" name="תמונה 2">
+            <a:extLst>
+              <a:ext uri="{FF2B5EF4-FFF2-40B4-BE49-F238E27FC236}">
+                <a16:creationId xmlns:a16="http://schemas.microsoft.com/office/drawing/2014/main" id="{2E2CA2A3-1FFE-4A09-8795-3C6EC5521272}"/>
+              </a:ext>
+            </a:extLst>
+          </p:cNvPr>
+          <p:cNvPicPr>
+            <a:picLocks noChangeAspect="1"/>
+          </p:cNvPicPr>
+          <p:nvPr/>
+        </p:nvPicPr>
+        <p:blipFill>
+          <a:blip r:embed="rId2"/>
+          <a:stretch>
+            <a:fillRect/>
+          </a:stretch>
+        </p:blipFill>
+        <p:spPr>
+          <a:xfrm>
+            <a:off x="0" y="0"/>
+            <a:ext cx="12192000" cy="6858000"/>
+          </a:xfrm>
+          <a:prstGeom prst="rect">
+            <a:avLst/>
+          </a:prstGeom>
+        </p:spPr>
+      </p:pic>
+    </p:spTree>
+    <p:extLst>
+      <p:ext uri="{BB962C8B-B14F-4D97-AF65-F5344CB8AC3E}">
+        <p14:creationId xmlns:p14="http://schemas.microsoft.com/office/powerpoint/2010/main" val="3272099140"/>
+      </p:ext>
+    </p:extLst>
+  </p:cSld>
+  <p:clrMapOvr>
+    <a:masterClrMapping/>
+  </p:clrMapOvr>
+</p:sld>
+</file>
+
+<file path=ppt/slides/slide16.xml><?xml version="1.0" encoding="utf-8"?>
+<p:sld xmlns:a="http://schemas.openxmlformats.org/drawingml/2006/main" xmlns:r="http://schemas.openxmlformats.org/officeDocument/2006/relationships" xmlns:p="http://schemas.openxmlformats.org/presentationml/2006/main">
+  <p:cSld>
+    <p:spTree>
+      <p:nvGrpSpPr>
+        <p:cNvPr id="1" name=""/>
+        <p:cNvGrpSpPr/>
+        <p:nvPr/>
+      </p:nvGrpSpPr>
+      <p:grpSpPr>
+        <a:xfrm>
+          <a:off x="0" y="0"/>
+          <a:ext cx="0" cy="0"/>
+          <a:chOff x="0" y="0"/>
+          <a:chExt cx="0" cy="0"/>
+        </a:xfrm>
+      </p:grpSpPr>
+      <p:pic>
+        <p:nvPicPr>
+          <p:cNvPr id="3" name="תמונה 2">
+            <a:extLst>
+              <a:ext uri="{FF2B5EF4-FFF2-40B4-BE49-F238E27FC236}">
+                <a16:creationId xmlns:a16="http://schemas.microsoft.com/office/drawing/2014/main" id="{0F5D216A-4007-4733-BA91-18E30D8A55F1}"/>
+              </a:ext>
+            </a:extLst>
+          </p:cNvPr>
+          <p:cNvPicPr>
+            <a:picLocks noChangeAspect="1"/>
+          </p:cNvPicPr>
+          <p:nvPr/>
+        </p:nvPicPr>
+        <p:blipFill>
+          <a:blip r:embed="rId2"/>
+          <a:stretch>
+            <a:fillRect/>
+          </a:stretch>
+        </p:blipFill>
+        <p:spPr>
+          <a:xfrm>
+            <a:off x="0" y="0"/>
+            <a:ext cx="12192000" cy="6981825"/>
+          </a:xfrm>
+          <a:prstGeom prst="rect">
+            <a:avLst/>
+          </a:prstGeom>
+        </p:spPr>
+      </p:pic>
+    </p:spTree>
+    <p:extLst>
+      <p:ext uri="{BB962C8B-B14F-4D97-AF65-F5344CB8AC3E}">
+        <p14:creationId xmlns:p14="http://schemas.microsoft.com/office/powerpoint/2010/main" val="3780672987"/>
+      </p:ext>
+    </p:extLst>
+  </p:cSld>
+  <p:clrMapOvr>
+    <a:masterClrMapping/>
+  </p:clrMapOvr>
+</p:sld>
+</file>
+
 <file path=ppt/slides/slide2.xml><?xml version="1.0" encoding="utf-8"?>
 <p:sld xmlns:a="http://schemas.openxmlformats.org/drawingml/2006/main" xmlns:r="http://schemas.openxmlformats.org/officeDocument/2006/relationships" xmlns:p="http://schemas.openxmlformats.org/presentationml/2006/main">
   <p:cSld>

</xml_diff>